<commit_message>
Another update to ppts
git-svn-id: https://svn.code.sf.net/p/electricdss/code@1975 d8739450-1e93-4ef4-a0af-c327d92816ff
</commit_message>
<xml_diff>
--- a/trunk/Training/GAPQ2017/PPT/6 Scripting Basics.pptx
+++ b/trunk/Training/GAPQ2017/PPT/6 Scripting Basics.pptx
@@ -245,7 +245,7 @@
           <a:p>
             <a:fld id="{21D603EA-85D6-422C-AB10-17A2A7923832}" type="datetimeFigureOut">
               <a:rPr lang="en-US" smtClean="0"/>
-              <a:t>6/13/2017</a:t>
+              <a:t>6/21/2017</a:t>
             </a:fld>
             <a:endParaRPr lang="en-US" dirty="0"/>
           </a:p>
@@ -3598,7 +3598,7 @@
         <p:nvSpPr>
           <p:cNvPr id="379907" name="Rectangle 2"/>
           <p:cNvSpPr>
-            <a:spLocks noRot="1" noChangeArrowheads="1" noTextEdit="1"/>
+            <a:spLocks noGrp="1" noRot="1" noChangeAspect="1" noChangeArrowheads="1" noTextEdit="1"/>
           </p:cNvSpPr>
           <p:nvPr>
             <p:ph type="sldImg"/>
@@ -3843,7 +3843,7 @@
         <p:nvSpPr>
           <p:cNvPr id="380931" name="Rectangle 2"/>
           <p:cNvSpPr>
-            <a:spLocks noRot="1" noChangeArrowheads="1" noTextEdit="1"/>
+            <a:spLocks noGrp="1" noRot="1" noChangeAspect="1" noChangeArrowheads="1" noTextEdit="1"/>
           </p:cNvSpPr>
           <p:nvPr>
             <p:ph type="sldImg"/>
@@ -7213,7 +7213,7 @@
         <p:nvSpPr>
           <p:cNvPr id="118788" name="Text Box 4"/>
           <p:cNvSpPr>
-            <a:spLocks noChangeArrowheads="1"/>
+            <a:spLocks noGrp="1" noChangeArrowheads="1"/>
           </p:cNvSpPr>
           <p:nvPr>
             <p:ph type="body" idx="1"/>
@@ -18430,33 +18430,29 @@
           <a:p>
             <a:pPr lvl="2"/>
             <a:r>
-              <a:rPr lang="en-US" altLang="en-US" b="1" dirty="0">
-                <a:latin typeface="Courier New" panose="02070309020205020404" pitchFamily="49" charset="0"/>
-              </a:rPr>
+              <a:rPr lang="en-US" altLang="en-US" b="1" dirty="0"/>
               <a:t>Show summary  </a:t>
             </a:r>
             <a:r>
-              <a:rPr lang="en-US" altLang="en-US" dirty="0">
-                <a:latin typeface="Courier New" panose="02070309020205020404" pitchFamily="49" charset="0"/>
-              </a:rPr>
+              <a:rPr lang="en-US" altLang="en-US" dirty="0"/>
               <a:t>(power flow summary)</a:t>
             </a:r>
           </a:p>
           <a:p>
             <a:r>
-              <a:rPr lang="en-US" altLang="en-US" sz="2800" b="1" dirty="0"/>
+              <a:rPr lang="en-US" altLang="en-US" b="1" dirty="0"/>
               <a:t>Show Voltages LN Nodes</a:t>
             </a:r>
           </a:p>
           <a:p>
             <a:r>
-              <a:rPr lang="en-US" altLang="en-US" sz="2800" b="1" dirty="0"/>
+              <a:rPr lang="en-US" altLang="en-US" b="1" dirty="0"/>
               <a:t>Show Currents Element</a:t>
             </a:r>
           </a:p>
           <a:p>
             <a:r>
-              <a:rPr lang="en-US" altLang="en-US" sz="2800" b="1" dirty="0"/>
+              <a:rPr lang="en-US" altLang="en-US" b="1" dirty="0"/>
               <a:t>Show Powers kVA Elements</a:t>
             </a:r>
           </a:p>
@@ -18475,15 +18471,23 @@
           <a:p>
             <a:pPr lvl="1"/>
             <a:r>
+              <a:rPr lang="en-US" altLang="en-US" b="1" dirty="0"/>
+              <a:t>Export</a:t>
+            </a:r>
+            <a:r>
               <a:rPr lang="en-US" altLang="en-US" dirty="0"/>
-              <a:t>Export …   (creates CSV files)</a:t>
+              <a:t> …   (creates CSV files)</a:t>
             </a:r>
           </a:p>
           <a:p>
             <a:pPr lvl="1"/>
             <a:r>
+              <a:rPr lang="en-US" altLang="en-US" b="1" dirty="0"/>
+              <a:t>Plot</a:t>
+            </a:r>
+            <a:r>
               <a:rPr lang="en-US" altLang="en-US" dirty="0"/>
-              <a:t>Plot …</a:t>
+              <a:t> …</a:t>
             </a:r>
           </a:p>
         </p:txBody>
@@ -19368,13 +19372,8 @@
             <a:pPr algn="r" eaLnBrk="1" hangingPunct="1"/>
             <a:r>
               <a:rPr lang="en-US" altLang="en-US" dirty="0"/>
-              <a:t>Scripting Basics – Simple </a:t>
-            </a:r>
-            <a:r>
-              <a:rPr lang="en-US" altLang="en-US" dirty="0" err="1"/>
-              <a:t>Circui</a:t>
-            </a:r>
-            <a:endParaRPr lang="en-US" altLang="en-US" dirty="0"/>
+              <a:t>Scripting Basics – Simple Circuit</a:t>
+            </a:r>
           </a:p>
         </p:txBody>
       </p:sp>
@@ -22224,20 +22223,20 @@
 </file>
 
 <file path=customXml/item1.xml><?xml version="1.0" encoding="utf-8"?>
+<p:properties xmlns:p="http://schemas.microsoft.com/office/2006/metadata/properties" xmlns:xsi="http://www.w3.org/2001/XMLSchema-instance" xmlns:pc="http://schemas.microsoft.com/office/infopath/2007/PartnerControls">
+  <documentManagement>
+    <Category xmlns="9d4eb815-23ed-48d9-b0c1-2b9ce0016f4e">EPRI PowerPoint Template</Category>
+  </documentManagement>
+</p:properties>
+</file>
+
+<file path=customXml/item2.xml><?xml version="1.0" encoding="utf-8"?>
 <?mso-contentType ?>
 <FormTemplates xmlns="http://schemas.microsoft.com/sharepoint/v3/contenttype/forms">
   <Display>DocumentLibraryForm</Display>
   <Edit>DocumentLibraryForm</Edit>
   <New>DocumentLibraryForm</New>
 </FormTemplates>
-</file>
-
-<file path=customXml/item2.xml><?xml version="1.0" encoding="utf-8"?>
-<p:properties xmlns:p="http://schemas.microsoft.com/office/2006/metadata/properties" xmlns:xsi="http://www.w3.org/2001/XMLSchema-instance" xmlns:pc="http://schemas.microsoft.com/office/infopath/2007/PartnerControls">
-  <documentManagement>
-    <Category xmlns="9d4eb815-23ed-48d9-b0c1-2b9ce0016f4e">EPRI PowerPoint Template</Category>
-  </documentManagement>
-</p:properties>
 </file>
 
 <file path=customXml/item3.xml><?xml version="1.0" encoding="utf-8"?>
@@ -22373,14 +22372,6 @@
 </file>
 
 <file path=customXml/itemProps1.xml><?xml version="1.0" encoding="utf-8"?>
-<ds:datastoreItem xmlns:ds="http://schemas.openxmlformats.org/officeDocument/2006/customXml" ds:itemID="{F99B5431-8C26-478B-808F-26BED01B748B}">
-  <ds:schemaRefs>
-    <ds:schemaRef ds:uri="http://schemas.microsoft.com/sharepoint/v3/contenttype/forms"/>
-  </ds:schemaRefs>
-</ds:datastoreItem>
-</file>
-
-<file path=customXml/itemProps2.xml><?xml version="1.0" encoding="utf-8"?>
 <ds:datastoreItem xmlns:ds="http://schemas.openxmlformats.org/officeDocument/2006/customXml" ds:itemID="{CB3A9CD0-2239-4A17-AE12-8DE9BDDF5A58}">
   <ds:schemaRefs>
     <ds:schemaRef ds:uri="http://purl.org/dc/elements/1.1/"/>
@@ -22392,6 +22383,14 @@
     <ds:schemaRef ds:uri="http://www.w3.org/XML/1998/namespace"/>
     <ds:schemaRef ds:uri="9d4eb815-23ed-48d9-b0c1-2b9ce0016f4e"/>
     <ds:schemaRef ds:uri="http://purl.org/dc/dcmitype/"/>
+  </ds:schemaRefs>
+</ds:datastoreItem>
+</file>
+
+<file path=customXml/itemProps2.xml><?xml version="1.0" encoding="utf-8"?>
+<ds:datastoreItem xmlns:ds="http://schemas.openxmlformats.org/officeDocument/2006/customXml" ds:itemID="{F99B5431-8C26-478B-808F-26BED01B748B}">
+  <ds:schemaRefs>
+    <ds:schemaRef ds:uri="http://schemas.microsoft.com/sharepoint/v3/contenttype/forms"/>
   </ds:schemaRefs>
 </ds:datastoreItem>
 </file>

</xml_diff>